<commit_message>
wds diagram updates avd from wvd
</commit_message>
<xml_diff>
--- a/Whiteboard design session/WDS trainer presentation - Implementing Azure Virtual Desktop in the enterprise.pptx
+++ b/Whiteboard design session/WDS trainer presentation - Implementing Azure Virtual Desktop in the enterprise.pptx
@@ -234,7 +234,7 @@
           <a:p>
             <a:fld id="{52A13B17-C506-4D51-BB37-16B365906619}" type="datetimeFigureOut">
               <a:rPr lang="en-US" smtClean="0"/>
-              <a:t>6/14/2021</a:t>
+              <a:t>6/18/2021</a:t>
             </a:fld>
             <a:endParaRPr lang="en-US" dirty="0"/>
           </a:p>
@@ -4666,7 +4666,7 @@
                   <a:prstClr val="black"/>
                 </a:solidFill>
               </a:rPr>
-              <a:t>6/14/2021 3:58 PM</a:t>
+              <a:t>6/18/2021 5:17 PM</a:t>
             </a:fld>
             <a:endParaRPr lang="en-US" dirty="0">
               <a:solidFill>
@@ -18024,21 +18024,20 @@
           <p:nvPr/>
         </p:nvPicPr>
         <p:blipFill>
-          <a:blip r:embed="rId3" cstate="print">
+          <a:blip r:embed="rId3">
             <a:extLst>
               <a:ext uri="{28A0092B-C50C-407E-A947-70E740481C1C}">
                 <a14:useLocalDpi xmlns:a14="http://schemas.microsoft.com/office/drawing/2010/main" val="0"/>
               </a:ext>
             </a:extLst>
           </a:blip>
-          <a:stretch>
-            <a:fillRect/>
-          </a:stretch>
+          <a:srcRect/>
+          <a:stretch/>
         </p:blipFill>
         <p:spPr>
           <a:xfrm>
-            <a:off x="6311849" y="1632857"/>
-            <a:ext cx="5198468" cy="3421878"/>
+            <a:off x="6341359" y="1632857"/>
+            <a:ext cx="5139447" cy="3421878"/>
           </a:xfrm>
           <a:prstGeom prst="rect">
             <a:avLst/>
@@ -18184,21 +18183,20 @@
           <p:nvPr/>
         </p:nvPicPr>
         <p:blipFill>
-          <a:blip r:embed="rId3" cstate="print">
+          <a:blip r:embed="rId3">
             <a:extLst>
               <a:ext uri="{28A0092B-C50C-407E-A947-70E740481C1C}">
                 <a14:useLocalDpi xmlns:a14="http://schemas.microsoft.com/office/drawing/2010/main" val="0"/>
               </a:ext>
             </a:extLst>
           </a:blip>
-          <a:stretch>
-            <a:fillRect/>
-          </a:stretch>
+          <a:srcRect/>
+          <a:stretch/>
         </p:blipFill>
         <p:spPr>
           <a:xfrm>
-            <a:off x="5596089" y="3343060"/>
-            <a:ext cx="6326672" cy="3301663"/>
+            <a:off x="5657220" y="3343060"/>
+            <a:ext cx="6204410" cy="3301663"/>
           </a:xfrm>
           <a:prstGeom prst="rect">
             <a:avLst/>
@@ -18321,7 +18319,7 @@
       </p:sp>
       <p:pic>
         <p:nvPicPr>
-          <p:cNvPr id="4" name="Picture 3" descr="The diagram on this slide is referencing that there are multiple devices that will need to connect to the Windows desktop virtual image for Windows 10 and Microsoft 365 applications via the WVD hostpool">
+          <p:cNvPr id="4" name="Picture 3" descr="The diagram on this slide is referencing that there are multiple devices that will need to connect to the Windows desktop virtual image for Windows 10 and Microsoft 365 applications via the WVD hostpool.">
             <a:extLst>
               <a:ext uri="{FF2B5EF4-FFF2-40B4-BE49-F238E27FC236}">
                 <a16:creationId xmlns:a16="http://schemas.microsoft.com/office/drawing/2014/main" id="{9C06C5E8-DE9F-47D7-9798-99F4D2F84BCE}"/>
@@ -18334,21 +18332,20 @@
           <p:nvPr/>
         </p:nvPicPr>
         <p:blipFill>
-          <a:blip r:embed="rId3" cstate="print">
+          <a:blip r:embed="rId3">
             <a:extLst>
               <a:ext uri="{28A0092B-C50C-407E-A947-70E740481C1C}">
                 <a14:useLocalDpi xmlns:a14="http://schemas.microsoft.com/office/drawing/2010/main" val="0"/>
               </a:ext>
             </a:extLst>
           </a:blip>
-          <a:stretch>
-            <a:fillRect/>
-          </a:stretch>
+          <a:srcRect/>
+          <a:stretch/>
         </p:blipFill>
         <p:spPr>
           <a:xfrm>
-            <a:off x="3107778" y="3294369"/>
-            <a:ext cx="5976444" cy="3294001"/>
+            <a:off x="3172285" y="3294369"/>
+            <a:ext cx="5847430" cy="3294001"/>
           </a:xfrm>
           <a:prstGeom prst="rect">
             <a:avLst/>
@@ -21034,14 +21031,13 @@
               </a:ext>
             </a:extLst>
           </a:blip>
-          <a:stretch>
-            <a:fillRect/>
-          </a:stretch>
+          <a:srcRect/>
+          <a:stretch/>
         </p:blipFill>
         <p:spPr>
           <a:xfrm>
             <a:off x="0" y="1189176"/>
-            <a:ext cx="12192000" cy="5100653"/>
+            <a:ext cx="12191999" cy="5100653"/>
           </a:xfrm>
           <a:prstGeom prst="rect">
             <a:avLst/>
@@ -24051,18 +24047,18 @@
 </file>
 
 <file path=customXml/item1.xml><?xml version="1.0" encoding="utf-8"?>
+<p:properties xmlns:p="http://schemas.microsoft.com/office/2006/metadata/properties" xmlns:xsi="http://www.w3.org/2001/XMLSchema-instance" xmlns:pc="http://schemas.microsoft.com/office/infopath/2007/PartnerControls">
+  <documentManagement/>
+</p:properties>
+</file>
+
+<file path=customXml/item2.xml><?xml version="1.0" encoding="utf-8"?>
 <?mso-contentType ?>
 <FormTemplates xmlns="http://schemas.microsoft.com/sharepoint/v3/contenttype/forms">
   <Display>DocumentLibraryForm</Display>
   <Edit>DocumentLibraryForm</Edit>
   <New>DocumentLibraryForm</New>
 </FormTemplates>
-</file>
-
-<file path=customXml/item2.xml><?xml version="1.0" encoding="utf-8"?>
-<p:properties xmlns:p="http://schemas.microsoft.com/office/2006/metadata/properties" xmlns:xsi="http://www.w3.org/2001/XMLSchema-instance" xmlns:pc="http://schemas.microsoft.com/office/infopath/2007/PartnerControls">
-  <documentManagement/>
-</p:properties>
 </file>
 
 <file path=customXml/item3.xml><?xml version="1.0" encoding="utf-8"?>
@@ -24245,14 +24241,6 @@
 </file>
 
 <file path=customXml/itemProps1.xml><?xml version="1.0" encoding="utf-8"?>
-<ds:datastoreItem xmlns:ds="http://schemas.openxmlformats.org/officeDocument/2006/customXml" ds:itemID="{FC7B288A-115F-4EDF-8326-05039CEE1DB1}">
-  <ds:schemaRefs>
-    <ds:schemaRef ds:uri="http://schemas.microsoft.com/sharepoint/v3/contenttype/forms"/>
-  </ds:schemaRefs>
-</ds:datastoreItem>
-</file>
-
-<file path=customXml/itemProps2.xml><?xml version="1.0" encoding="utf-8"?>
 <ds:datastoreItem xmlns:ds="http://schemas.openxmlformats.org/officeDocument/2006/customXml" ds:itemID="{2AC6E67E-42B4-40AF-80F4-D98253E4E21A}">
   <ds:schemaRefs>
     <ds:schemaRef ds:uri="24937d34-002f-4836-b77c-e21f12df0152"/>
@@ -24265,6 +24253,14 @@
     <ds:schemaRef ds:uri="http://schemas.openxmlformats.org/package/2006/metadata/core-properties"/>
     <ds:schemaRef ds:uri="http://purl.org/dc/dcmitype/"/>
     <ds:schemaRef ds:uri="http://purl.org/dc/elements/1.1/"/>
+  </ds:schemaRefs>
+</ds:datastoreItem>
+</file>
+
+<file path=customXml/itemProps2.xml><?xml version="1.0" encoding="utf-8"?>
+<ds:datastoreItem xmlns:ds="http://schemas.openxmlformats.org/officeDocument/2006/customXml" ds:itemID="{FC7B288A-115F-4EDF-8326-05039CEE1DB1}">
+  <ds:schemaRefs>
+    <ds:schemaRef ds:uri="http://schemas.microsoft.com/sharepoint/v3/contenttype/forms"/>
   </ds:schemaRefs>
 </ds:datastoreItem>
 </file>

</xml_diff>

<commit_message>
update to PPTX and images, WDS product name udpate
</commit_message>
<xml_diff>
--- a/Whiteboard design session/WDS trainer presentation - Implementing Azure Virtual Desktop in the enterprise.pptx
+++ b/Whiteboard design session/WDS trainer presentation - Implementing Azure Virtual Desktop in the enterprise.pptx
@@ -156,6 +156,7 @@
 <p1510:revInfo xmlns:a="http://schemas.openxmlformats.org/drawingml/2006/main" xmlns:r="http://schemas.openxmlformats.org/officeDocument/2006/relationships" xmlns:p1510="http://schemas.microsoft.com/office/powerpoint/2015/10/main">
   <p1510:revLst>
     <p1510:client id="{161B5F60-BE88-41CE-8ED8-23B0C2920611}" v="1" dt="2021-06-22T21:41:16.520"/>
+    <p1510:client id="{1C3CF6A3-6B31-43AD-95FD-04E6AC46FECE}" v="2" dt="2022-08-08T02:27:40.219"/>
   </p1510:revLst>
 </p1510:revInfo>
 </file>
@@ -242,7 +243,7 @@
           <a:p>
             <a:fld id="{52A13B17-C506-4D51-BB37-16B365906619}" type="datetimeFigureOut">
               <a:rPr lang="en-US" smtClean="0"/>
-              <a:t>10/29/2021</a:t>
+              <a:t>8/7/2022</a:t>
             </a:fld>
             <a:endParaRPr lang="en-US" dirty="0"/>
           </a:p>
@@ -624,7 +625,7 @@
                 <a:latin typeface="+mn-lt"/>
                 <a:cs typeface="Segoe UI" panose="020B0502040204020203" pitchFamily="34" charset="0"/>
               </a:rPr>
-              <a:t>August 2020</a:t>
+              <a:t>August 2022</a:t>
             </a:r>
           </a:p>
         </p:txBody>
@@ -947,7 +948,7 @@
                 <a:ea typeface="+mn-ea"/>
                 <a:cs typeface="+mn-cs"/>
               </a:rPr>
-              <a:t>Common scenario of how Azure Monitor and Network Watcher can be used for both Azure and non-Azure VMs and network connections.  On the right, the on-premises servers are connected to Azure Monitor with an agent and Network Watcher is monitoring the connection between the on-premises datacenter and Azure.  In Azure, Azure Monitor is connected to the Azure Virtual Desktop host pool instances, and network watcher is monitoring the connect to these hosts and the VNET.  The metric and activity log information is then fed into Azure Monitor, Log Analytics, Azure Policy, and Azure Security Center for managing these resources for performance, activity, and compliance.</a:t>
+              <a:t>Common scenario of how Azure Monitor and Network Watcher can be used for both Azure and non-Azure VMs and network connections.  On the right, the on-premises servers are connected to Azure Monitor with an agent and Network Watcher is monitoring the connection between the on-premises datacenter and Azure.  In Azure, Azure Monitor is connected to the Azure Virtual Desktop host pool instances, and network watcher is monitoring the connect to these hosts and the VNET.  The metric and activity log information is then fed into Azure Monitor, Log Analytics, Azure Policy, and Microsoft Defender for Cloud for managing these resources for performance, activity, and compliance.</a:t>
             </a:r>
             <a:endParaRPr lang="en-US" dirty="0"/>
           </a:p>
@@ -1947,7 +1948,7 @@
                 <a:ea typeface="+mn-ea"/>
                 <a:cs typeface="+mn-cs"/>
               </a:rPr>
-              <a:t>Microsoft Enterprise Mobility + Security E3 or E5 are required for Intune MDM.</a:t>
+              <a:t>Microsoft Enterprise Mobility + Security E3 or E5 are required for Intune MDM. However, EMS E3 and EMS E5 are included with Microsoft 365 E3 and Microsoft 365 E5 respectively. So by purchasing a Microsoft 365 license (instead of Office 365), this license will be included.</a:t>
             </a:r>
           </a:p>
           <a:p>
@@ -1997,8 +1998,32 @@
                 <a:ea typeface="+mn-ea"/>
                 <a:cs typeface="+mn-cs"/>
               </a:rPr>
-              <a:t>A Microsoft 365 E5 license is required for the full suite of data protection, information protection and classification, and advanced threat protection capabilities.</a:t>
-            </a:r>
+              <a:t>A Microsoft 365 E5 license is required for the full suite of data protection, information protection and classification, and </a:t>
+            </a:r>
+            <a:r>
+              <a:rPr lang="en-US" dirty="0"/>
+              <a:t>Microsoft Defender</a:t>
+            </a:r>
+            <a:r>
+              <a:rPr lang="en-US" sz="1200" b="0" i="0" kern="1200" dirty="0">
+                <a:solidFill>
+                  <a:schemeClr val="tx1"/>
+                </a:solidFill>
+                <a:effectLst/>
+                <a:latin typeface="+mn-lt"/>
+                <a:ea typeface="+mn-ea"/>
+                <a:cs typeface="+mn-cs"/>
+              </a:rPr>
+              <a:t> capabilities.</a:t>
+            </a:r>
+            <a:endParaRPr lang="en-US" sz="1200" b="0" i="0" kern="1200" dirty="0">
+              <a:solidFill>
+                <a:schemeClr val="tx1"/>
+              </a:solidFill>
+              <a:effectLst/>
+              <a:latin typeface="+mn-lt"/>
+              <a:cs typeface="Calibri"/>
+            </a:endParaRPr>
           </a:p>
           <a:p>
             <a:endParaRPr lang="en-US" sz="1200" b="0" i="0" kern="1200" dirty="0">
@@ -2097,7 +2122,7 @@
                 <a:ea typeface="+mn-ea"/>
                 <a:cs typeface="+mn-cs"/>
               </a:rPr>
-              <a:t>A Microsoft 365 Enterprise E5 will be required with Enterprise Mobility + Security E5 to support the full list of requirements outlined by the customer. Microsoft 365 licenses that support Azure Virtual Desktop include M365 E3, E5, A3, A5, F3, and Business Premium. However, the additional requirements for mobile device management, data classification and information protection, and conditional access policies require the E5 and EMS E5 licenses. Business Premium licensing is also only supported to up to 300 users.</a:t>
+              <a:t>A Microsoft 365 Enterprise E5 will be required to support the full list of requirements outlined by the customer. Microsoft 365 licenses that support Azure Virtual Desktop include M365 E3, E5, A3, A5, F3, and Business Premium. However, the additional requirements for mobile device management, data classification and information protection, and conditional access policies require the licenses. Business Premium licensing is also only supported to up to 300 users.</a:t>
             </a:r>
           </a:p>
           <a:p>
@@ -2245,7 +2270,7 @@
                 <a:ea typeface="+mn-ea"/>
                 <a:cs typeface="+mn-cs"/>
               </a:rPr>
-              <a:t>Azure Policy initiatives for ISO 27001 and HIPAA should be enabled for the resource groups that are created to govern the Azure Virtual Desktop infrastructure. In addition, Azure Security Center should be upgraded to the Standard tier subscription to properly monitor and alert on control compliance to ISO 27001 and HIPAA standards.</a:t>
+              <a:t>Azure Policy initiatives for ISO 27001 and HIPAA should be enabled for the resource groups that are created to govern the Azure Virtual Desktop infrastructure. In addition, Microsoft Defender for Cloud should be upgraded to the Standard tier subscription to properly monitor and alert on control compliance to ISO 27001 and HIPAA standards.</a:t>
             </a:r>
           </a:p>
           <a:p>
@@ -2320,8 +2345,32 @@
                 <a:ea typeface="+mn-ea"/>
                 <a:cs typeface="+mn-cs"/>
               </a:rPr>
-              <a:t>Azure Monitor agents should be installed on all Azure and on-premises virtual machines in order to govern the Azure Policy initiatives. These agents will provide activity logs that can be monitored within Azure Security Center.</a:t>
-            </a:r>
+              <a:t>Azure Monitor agents should be installed on all Azure and on-premises virtual machines in order to govern the Azure Policy initiatives. These agents will provide activity logs that can be monitored within </a:t>
+            </a:r>
+            <a:r>
+              <a:rPr lang="en-US" dirty="0"/>
+              <a:t>Microsoft Defender for Cloud</a:t>
+            </a:r>
+            <a:r>
+              <a:rPr lang="en-US" sz="1200" b="0" i="0" kern="1200" dirty="0">
+                <a:solidFill>
+                  <a:schemeClr val="tx1"/>
+                </a:solidFill>
+                <a:effectLst/>
+                <a:latin typeface="+mn-lt"/>
+                <a:ea typeface="+mn-ea"/>
+                <a:cs typeface="+mn-cs"/>
+              </a:rPr>
+              <a:t>.</a:t>
+            </a:r>
+            <a:endParaRPr lang="en-US" sz="1200" b="0" i="0" kern="1200" dirty="0">
+              <a:solidFill>
+                <a:schemeClr val="tx1"/>
+              </a:solidFill>
+              <a:effectLst/>
+              <a:latin typeface="+mn-lt"/>
+              <a:cs typeface="Calibri"/>
+            </a:endParaRPr>
           </a:p>
           <a:p>
             <a:endParaRPr lang="en-US" sz="1200" b="0" i="0" kern="1200" dirty="0">
@@ -2345,7 +2394,7 @@
                 <a:ea typeface="+mn-ea"/>
                 <a:cs typeface="+mn-cs"/>
               </a:rPr>
-              <a:t>ATP should be used to monitor threats.</a:t>
+              <a:t>Microsoft Defender should be used to monitor threats.</a:t>
             </a:r>
           </a:p>
           <a:p>
@@ -2370,7 +2419,7 @@
                 <a:ea typeface="+mn-ea"/>
                 <a:cs typeface="+mn-cs"/>
               </a:rPr>
-              <a:t>Azure Sentinel should be used for incident response and investigation.</a:t>
+              <a:t>Microsoft Sentinel should be used for incident response and investigation.</a:t>
             </a:r>
           </a:p>
           <a:p>
@@ -2445,7 +2494,7 @@
                 <a:ea typeface="+mn-ea"/>
                 <a:cs typeface="+mn-cs"/>
               </a:rPr>
-              <a:t>Cloud App Security for managing authorized applications. This will be used to block unauthorized cloud storage services to protect data from being copied.</a:t>
+              <a:t>Microsoft Defender for Cloud Apps for managing authorized applications. This will be used to block unauthorized cloud storage services to protect data from being copied.</a:t>
             </a:r>
           </a:p>
           <a:p>
@@ -2595,7 +2644,7 @@
                 <a:ea typeface="+mn-ea"/>
                 <a:cs typeface="+mn-cs"/>
               </a:rPr>
-              <a:t>Azure Monitor, Log Analytics, ATP, Cloud App Security, Azure Security Center, and Azure Sentinel will provide services to monitor, manage and investigate any potential vulnerabilities, threats, or anomalies within the environment to protect users and data across Azure, Microsoft 365, and on-premises resources.</a:t>
+              <a:t>Azure Monitor, Log Analytics, Microsoft Defender, and Microsoft Sentinel will provide services to monitor, manage and investigate any potential vulnerabilities, threats, or anomalies within the environment to protect users and data across Azure, Microsoft 365, and on-premises resources.</a:t>
             </a:r>
           </a:p>
           <a:p>
@@ -3043,8 +3092,32 @@
                 <a:ea typeface="+mn-ea"/>
                 <a:cs typeface="+mn-cs"/>
               </a:rPr>
-              <a:t>Azure Monitor, Azure Log Analytics, and Advanced Threat Protection should all be turned on with actions and alerts to the security group.</a:t>
-            </a:r>
+              <a:t>Azure Monitor, Azure Log Analytics, and </a:t>
+            </a:r>
+            <a:r>
+              <a:rPr lang="en-US" dirty="0"/>
+              <a:t>Microsoft Defender</a:t>
+            </a:r>
+            <a:r>
+              <a:rPr lang="en-US" sz="1200" b="0" i="0" kern="1200" dirty="0">
+                <a:solidFill>
+                  <a:schemeClr val="tx1"/>
+                </a:solidFill>
+                <a:effectLst/>
+                <a:latin typeface="+mn-lt"/>
+                <a:ea typeface="+mn-ea"/>
+                <a:cs typeface="+mn-cs"/>
+              </a:rPr>
+              <a:t> should all be turned on with actions and alerts to the security group.</a:t>
+            </a:r>
+            <a:endParaRPr lang="en-US" sz="1200" b="0" i="0" kern="1200" dirty="0">
+              <a:solidFill>
+                <a:schemeClr val="tx1"/>
+              </a:solidFill>
+              <a:effectLst/>
+              <a:latin typeface="+mn-lt"/>
+              <a:cs typeface="Calibri"/>
+            </a:endParaRPr>
           </a:p>
           <a:p>
             <a:endParaRPr lang="en-US" sz="1200" b="0" i="0" kern="1200" dirty="0">
@@ -3068,8 +3141,32 @@
                 <a:ea typeface="+mn-ea"/>
                 <a:cs typeface="+mn-cs"/>
               </a:rPr>
-              <a:t>The Azure Security Center standard subscription will provide a central dashboard for monitoring, locating, and alerting on common threats found in the Microsoft Threat database.</a:t>
-            </a:r>
+              <a:t>The </a:t>
+            </a:r>
+            <a:r>
+              <a:rPr lang="en-US" dirty="0"/>
+              <a:t>Microsoft Defender for Cloud</a:t>
+            </a:r>
+            <a:r>
+              <a:rPr lang="en-US" sz="1200" b="0" i="0" kern="1200" dirty="0">
+                <a:solidFill>
+                  <a:schemeClr val="tx1"/>
+                </a:solidFill>
+                <a:effectLst/>
+                <a:latin typeface="+mn-lt"/>
+                <a:ea typeface="+mn-ea"/>
+                <a:cs typeface="+mn-cs"/>
+              </a:rPr>
+              <a:t> standard subscription will provide a central dashboard for monitoring, locating, and alerting on common threats found in the Microsoft Threat database.</a:t>
+            </a:r>
+            <a:endParaRPr lang="en-US" sz="1200" b="0" i="0" kern="1200" dirty="0">
+              <a:solidFill>
+                <a:schemeClr val="tx1"/>
+              </a:solidFill>
+              <a:effectLst/>
+              <a:latin typeface="+mn-lt"/>
+              <a:cs typeface="Calibri"/>
+            </a:endParaRPr>
           </a:p>
           <a:p>
             <a:endParaRPr lang="en-US" sz="1200" b="0" i="0" kern="1200" dirty="0">
@@ -3350,7 +3447,7 @@
                 <a:ea typeface="+mn-ea"/>
                 <a:cs typeface="+mn-cs"/>
               </a:rPr>
-              <a:t>The recommendation would be to create the managed AVD image that Contoso Healthcare is wanting to deliver to their users. Optionally, they could also create a VHD for the standard image. Details on this process are in the links provided in the student guide. Another option is to have an image created with Windows 10 multi-user licensing and Office365 ProPlus at the time of creating the Azure Virtual Desktop host pool, then making adjustments to that image based on custom requirements. You could use the following automated image building solutions to create and manage this image, such as Azure Image Builder (</a:t>
+              <a:t>The recommendation would be to create the managed AVD image that Contoso Healthcare is wanting to deliver to their users. Optionally, they could also create a VHD for the standard image. Details on this process are in the links provided in the student guide. Another option is to have an image created with Windows 10 multi-user licensing and Microsoft 365 Apps for enterprise at the time of creating the Azure Virtual Desktop host pool, then making adjustments to that image based on custom requirements. You could use the following automated image building solutions to create and manage this image, such as Azure Image Builder (</a:t>
             </a:r>
             <a:r>
               <a:rPr lang="en-US" sz="1200" b="0" i="0" u="none" strike="noStrike" kern="1200" dirty="0">
@@ -4522,6 +4619,90 @@
             <p:ph type="sldImg"/>
           </p:nvPr>
         </p:nvSpPr>
+        <p:spPr/>
+      </p:sp>
+      <p:sp>
+        <p:nvSpPr>
+          <p:cNvPr id="3" name="Notes Placeholder 2"/>
+          <p:cNvSpPr>
+            <a:spLocks noGrp="1"/>
+          </p:cNvSpPr>
+          <p:nvPr>
+            <p:ph type="body" idx="1"/>
+          </p:nvPr>
+        </p:nvSpPr>
+        <p:spPr/>
+        <p:txBody>
+          <a:bodyPr/>
+          <a:lstStyle/>
+          <a:p>
+            <a:endParaRPr lang="en-US" dirty="0"/>
+          </a:p>
+        </p:txBody>
+      </p:sp>
+      <p:sp>
+        <p:nvSpPr>
+          <p:cNvPr id="4" name="Slide Number Placeholder 3"/>
+          <p:cNvSpPr>
+            <a:spLocks noGrp="1"/>
+          </p:cNvSpPr>
+          <p:nvPr>
+            <p:ph type="sldNum" sz="quarter" idx="5"/>
+          </p:nvPr>
+        </p:nvSpPr>
+        <p:spPr/>
+        <p:txBody>
+          <a:bodyPr/>
+          <a:lstStyle/>
+          <a:p>
+            <a:fld id="{0998D5BB-B127-481F-BC0A-2F77C576BB34}" type="slidenum">
+              <a:rPr lang="en-US" smtClean="0"/>
+              <a:t>33</a:t>
+            </a:fld>
+            <a:endParaRPr lang="en-US" dirty="0"/>
+          </a:p>
+        </p:txBody>
+      </p:sp>
+    </p:spTree>
+    <p:extLst>
+      <p:ext uri="{BB962C8B-B14F-4D97-AF65-F5344CB8AC3E}">
+        <p14:creationId xmlns:p14="http://schemas.microsoft.com/office/powerpoint/2010/main" val="2721236176"/>
+      </p:ext>
+    </p:extLst>
+  </p:cSld>
+  <p:clrMapOvr>
+    <a:masterClrMapping/>
+  </p:clrMapOvr>
+</p:notes>
+</file>
+
+<file path=ppt/notesSlides/notesSlide33.xml><?xml version="1.0" encoding="utf-8"?>
+<p:notes xmlns:a="http://schemas.openxmlformats.org/drawingml/2006/main" xmlns:r="http://schemas.openxmlformats.org/officeDocument/2006/relationships" xmlns:p="http://schemas.openxmlformats.org/presentationml/2006/main">
+  <p:cSld>
+    <p:spTree>
+      <p:nvGrpSpPr>
+        <p:cNvPr id="1" name=""/>
+        <p:cNvGrpSpPr/>
+        <p:nvPr/>
+      </p:nvGrpSpPr>
+      <p:grpSpPr>
+        <a:xfrm>
+          <a:off x="0" y="0"/>
+          <a:ext cx="0" cy="0"/>
+          <a:chOff x="0" y="0"/>
+          <a:chExt cx="0" cy="0"/>
+        </a:xfrm>
+      </p:grpSpPr>
+      <p:sp>
+        <p:nvSpPr>
+          <p:cNvPr id="2" name="Slide Image Placeholder 1"/>
+          <p:cNvSpPr>
+            <a:spLocks noGrp="1" noRot="1" noChangeAspect="1"/>
+          </p:cNvSpPr>
+          <p:nvPr>
+            <p:ph type="sldImg"/>
+          </p:nvPr>
+        </p:nvSpPr>
         <p:spPr>
           <a:xfrm>
             <a:off x="381000" y="685800"/>
@@ -4602,7 +4783,7 @@
                   <a:prstClr val="black"/>
                 </a:solidFill>
               </a:rPr>
-              <a:t>10/29/2021 3:34 PM</a:t>
+              <a:t>8/7/2022 7:26 PM</a:t>
             </a:fld>
             <a:endParaRPr lang="en-US" dirty="0">
               <a:solidFill>
@@ -17947,10 +18128,10 @@
       </p:sp>
       <p:pic>
         <p:nvPicPr>
-          <p:cNvPr id="5" name="Picture 4" descr="This slide shows a common scenario of how Azure Monitor and Network Watcher can be used for both Azure and non-Azure VMs and network connections.  On the right, the on-premises servers are connected to Azure Monitor with an agent and Network Watcher is monitoring the connection between the on-premises datacenter and Azure.  In Azure, Azure Monitor is connected to the Windows Virtual Desktop host pool instances, and network watcher is monitoring the connect to these hosts and the VNET.  The metric and activity log information is then fed into Azure Monitor, Log Analytics, Azure Policy, and Azure Security Center for managing these resources for performance, activity, and compliance.">
+          <p:cNvPr id="4" name="Picture 3">
             <a:extLst>
               <a:ext uri="{FF2B5EF4-FFF2-40B4-BE49-F238E27FC236}">
-                <a16:creationId xmlns:a16="http://schemas.microsoft.com/office/drawing/2014/main" id="{586118C0-7D75-4231-AC41-A66655108864}"/>
+                <a16:creationId xmlns:a16="http://schemas.microsoft.com/office/drawing/2014/main" id="{3C48FA14-6FFE-DE41-F0C4-E4AC92E7A8BE}"/>
               </a:ext>
             </a:extLst>
           </p:cNvPr>
@@ -17960,20 +18141,15 @@
           <p:nvPr/>
         </p:nvPicPr>
         <p:blipFill>
-          <a:blip r:embed="rId3">
-            <a:extLst>
-              <a:ext uri="{28A0092B-C50C-407E-A947-70E740481C1C}">
-                <a14:useLocalDpi xmlns:a14="http://schemas.microsoft.com/office/drawing/2010/main" val="0"/>
-              </a:ext>
-            </a:extLst>
-          </a:blip>
-          <a:srcRect/>
-          <a:stretch/>
+          <a:blip r:embed="rId3"/>
+          <a:stretch>
+            <a:fillRect/>
+          </a:stretch>
         </p:blipFill>
         <p:spPr>
           <a:xfrm>
-            <a:off x="6341359" y="1632857"/>
-            <a:ext cx="5139447" cy="3421878"/>
+            <a:off x="6271263" y="1922323"/>
+            <a:ext cx="5651500" cy="3746500"/>
           </a:xfrm>
           <a:prstGeom prst="rect">
             <a:avLst/>
@@ -20456,14 +20632,14 @@
             <a:pPr lvl="1"/>
             <a:r>
               <a:rPr lang="en-US" sz="2800" b="1" dirty="0"/>
-              <a:t>Microsoft 365 E5 with EMS E5</a:t>
+              <a:t>Microsoft 365 E5</a:t>
             </a:r>
           </a:p>
           <a:p>
             <a:pPr lvl="1"/>
             <a:r>
               <a:rPr lang="en-US" sz="2800" b="1" dirty="0"/>
-              <a:t>These subscriptions address the requirements for mobile device management, data classification and information protection, and conditional access policies.</a:t>
+              <a:t>This subscription addresses the requirements for mobile device management, data classification and information protection, and conditional access policies.</a:t>
             </a:r>
           </a:p>
         </p:txBody>
@@ -20569,7 +20745,7 @@
             <a:pPr lvl="1"/>
             <a:r>
               <a:rPr lang="en-US" sz="1800" dirty="0"/>
-              <a:t>Azure Security Center Standard Tier and Azure Policy initiatives for HIPAA and ISO 27001 controls</a:t>
+              <a:t>Microsoft Defender for Cloud Standard Tier and Azure Policy initiatives for HIPAA and ISO 27001 controls</a:t>
             </a:r>
           </a:p>
           <a:p>
@@ -20595,14 +20771,14 @@
             <a:pPr lvl="1"/>
             <a:r>
               <a:rPr lang="en-US" sz="1800" dirty="0"/>
-              <a:t>ATP should be used to monitor threats.  </a:t>
+              <a:t>Microsoft Defender should be used to monitor threats.  </a:t>
             </a:r>
           </a:p>
           <a:p>
             <a:pPr lvl="1"/>
             <a:r>
               <a:rPr lang="en-US" sz="1800" dirty="0"/>
-              <a:t>Azure Sentinel should be used for incident response and investigation</a:t>
+              <a:t>Microsoft Sentinel should be used for incident response and investigation</a:t>
             </a:r>
           </a:p>
           <a:p>
@@ -20615,7 +20791,7 @@
             <a:pPr lvl="1"/>
             <a:r>
               <a:rPr lang="en-US" sz="1800" dirty="0"/>
-              <a:t>Cloud App Security for managing authorized applications. </a:t>
+              <a:t>Microsoft Defender for Cloud Apps for managing authorized applications. </a:t>
             </a:r>
           </a:p>
           <a:p>
@@ -20702,7 +20878,7 @@
         <p:spPr>
           <a:xfrm>
             <a:off x="266920" y="967154"/>
-            <a:ext cx="10956251" cy="6392942"/>
+            <a:ext cx="10956251" cy="5900077"/>
           </a:xfrm>
         </p:spPr>
         <p:txBody>
@@ -20785,14 +20961,7 @@
             <a:pPr lvl="1"/>
             <a:r>
               <a:rPr lang="en-US" sz="1600" dirty="0"/>
-              <a:t>Azure Log Analytics</a:t>
-            </a:r>
-          </a:p>
-          <a:p>
-            <a:pPr lvl="1"/>
-            <a:r>
-              <a:rPr lang="en-US" sz="1600" dirty="0"/>
-              <a:t>Advance Threat Protection (ATP)</a:t>
+              <a:t>Microsoft Defender</a:t>
             </a:r>
           </a:p>
           <a:p>
@@ -20813,14 +20982,14 @@
             <a:pPr lvl="1"/>
             <a:r>
               <a:rPr lang="en-US" sz="1600" dirty="0"/>
-              <a:t>Azure Security Center</a:t>
+              <a:t>Microsoft Defender for Cloud Apps</a:t>
             </a:r>
           </a:p>
           <a:p>
             <a:pPr lvl="1"/>
             <a:r>
               <a:rPr lang="en-US" sz="1600" dirty="0"/>
-              <a:t>Azure Sentinel</a:t>
+              <a:t>Microsoft Sentinel</a:t>
             </a:r>
           </a:p>
           <a:p>
@@ -20929,7 +21098,7 @@
         <p:spPr>
           <a:xfrm>
             <a:off x="269239" y="1189177"/>
-            <a:ext cx="10202818" cy="5327612"/>
+            <a:ext cx="10202818" cy="6103209"/>
           </a:xfrm>
         </p:spPr>
         <p:txBody>
@@ -20938,7 +21107,7 @@
           <a:p>
             <a:r>
               <a:rPr lang="en-US" sz="2800" dirty="0"/>
-              <a:t>New Windows 10 multi-user workspace with Office 365 ProPlus</a:t>
+              <a:t>New Windows 10 multi-user workspace with Microsoft 365 Apps for enterprise</a:t>
             </a:r>
           </a:p>
           <a:p>
@@ -20950,8 +21119,13 @@
           <a:p>
             <a:r>
               <a:rPr lang="en-US" sz="2800" dirty="0"/>
-              <a:t>Authorized applications managed through Cloud App Security</a:t>
-            </a:r>
+              <a:t>Authorized applications managed through Microsoft Defender </a:t>
+            </a:r>
+            <a:r>
+              <a:rPr lang="en-US" sz="2800"/>
+              <a:t>for Cloud Apps</a:t>
+            </a:r>
+            <a:endParaRPr lang="en-US" sz="2800" dirty="0"/>
           </a:p>
           <a:p>
             <a:r>
@@ -21573,7 +21747,7 @@
             </a:pPr>
             <a:r>
               <a:rPr lang="en-US" sz="2400" dirty="0"/>
-              <a:t>The designed solution for Contoso Healthcare includes Microsoft 365 E5 with Enterprise Mobility + Security (EMS) E5. This provides a full suite of data and information protection to classify sensitive data and audit activity. Cloud App Security can also be used to block access to unauthorized file sharing services to avoid users from copying files to unprotected locations. Data protection controls can be monitored through Microsoft 365 security adviser, and Azure Security Center.</a:t>
+              <a:t>The designed solution for Contoso Healthcare includes Microsoft 365 E5 which includes Enterprise Mobility + Security (EMS) E5. This provides a full suite of data and information protection to classify sensitive data and audit activity. Microsoft Defender for Cloud Apps can also be used to block access to unauthorized file sharing services to avoid users from copying files to unprotected locations. Data protection controls can be monitored through Microsoft 365 security adviser, and Microsoft Defender for Cloud.</a:t>
             </a:r>
             <a:endParaRPr lang="en-US" sz="2400" dirty="0">
               <a:solidFill>
@@ -22113,7 +22287,7 @@
             </a:pPr>
             <a:r>
               <a:rPr lang="en-US" sz="2400" dirty="0"/>
-              <a:t>The initial design will utilize a secure and encrypted site-to-site VPN connection from Azure to the Detroit data center. An option has also been provided to utilize an Azure ExpressRoute connection to provide private dedicated connectivity from Azure to the Detroit data center. Network Watcher will be used to monitor network traffic and throughput over the connections. Azure Security Center and Advanced Threat Protection will be in place to monitor and alert on potential vulnerabilities and threats.</a:t>
+              <a:t>The initial design will utilize a secure and encrypted site-to-site VPN connection from Azure to the Detroit data center. An option has also been provided to utilize an Azure ExpressRoute connection to provide private dedicated connectivity from Azure to the Detroit data center. Network Watcher will be used to monitor network traffic and throughput over the connections. Microsoft Defender will be in place to monitor and alert on potential vulnerabilities and threats.</a:t>
             </a:r>
             <a:endParaRPr lang="en-US" sz="2400" dirty="0">
               <a:solidFill>
@@ -24234,10 +24408,24 @@
 </file>
 
 <file path=customXml/item1.xml><?xml version="1.0" encoding="utf-8"?>
-<ct:contentTypeSchema xmlns:ct="http://schemas.microsoft.com/office/2006/metadata/contentType" xmlns:ma="http://schemas.microsoft.com/office/2006/metadata/properties/metaAttributes" ct:_="" ma:_="" ma:contentTypeName="Document" ma:contentTypeID="0x010100BCA4EC527BF874469D7E5FECF7D9FB70" ma:contentTypeVersion="6" ma:contentTypeDescription="Create a new document." ma:contentTypeScope="" ma:versionID="63bcfb01198a5f4cc35071d76a13e973">
-  <xsd:schema xmlns:xsd="http://www.w3.org/2001/XMLSchema" xmlns:xs="http://www.w3.org/2001/XMLSchema" xmlns:p="http://schemas.microsoft.com/office/2006/metadata/properties" xmlns:ns2="25b059c1-e0b1-4aae-b8e7-a9c1a20f7312" xmlns:ns3="24937d34-002f-4836-b77c-e21f12df0152" targetNamespace="http://schemas.microsoft.com/office/2006/metadata/properties" ma:root="true" ma:fieldsID="12b927a22a17d3f79cc59c0932bea1cb" ns2:_="" ns3:_="">
-    <xsd:import namespace="25b059c1-e0b1-4aae-b8e7-a9c1a20f7312"/>
-    <xsd:import namespace="24937d34-002f-4836-b77c-e21f12df0152"/>
+<p:properties xmlns:p="http://schemas.microsoft.com/office/2006/metadata/properties" xmlns:xsi="http://www.w3.org/2001/XMLSchema-instance" xmlns:pc="http://schemas.microsoft.com/office/infopath/2007/PartnerControls">
+  <documentManagement/>
+</p:properties>
+</file>
+
+<file path=customXml/item2.xml><?xml version="1.0" encoding="utf-8"?>
+<?mso-contentType ?>
+<FormTemplates xmlns="http://schemas.microsoft.com/sharepoint/v3/contenttype/forms">
+  <Display>DocumentLibraryForm</Display>
+  <Edit>DocumentLibraryForm</Edit>
+  <New>DocumentLibraryForm</New>
+</FormTemplates>
+</file>
+
+<file path=customXml/item3.xml><?xml version="1.0" encoding="utf-8"?>
+<ct:contentTypeSchema xmlns:ct="http://schemas.microsoft.com/office/2006/metadata/contentType" xmlns:ma="http://schemas.microsoft.com/office/2006/metadata/properties/metaAttributes" ct:_="" ma:_="" ma:contentTypeName="Document" ma:contentTypeID="0x010100CCB022B0BB7EDD48BB3CD3D2824A3A56" ma:contentTypeVersion="4" ma:contentTypeDescription="Create a new document." ma:contentTypeScope="" ma:versionID="9ee9c5364c65ce15610c8eca70a53ece">
+  <xsd:schema xmlns:xsd="http://www.w3.org/2001/XMLSchema" xmlns:xs="http://www.w3.org/2001/XMLSchema" xmlns:p="http://schemas.microsoft.com/office/2006/metadata/properties" xmlns:ns2="ce9d22e8-e53b-4a04-8e21-044bd7a40ef2" targetNamespace="http://schemas.microsoft.com/office/2006/metadata/properties" ma:root="true" ma:fieldsID="63acd3e2226f8dbeb7d00f508b30a179" ns2:_="">
+    <xsd:import namespace="ce9d22e8-e53b-4a04-8e21-044bd7a40ef2"/>
     <xsd:element name="properties">
       <xsd:complexType>
         <xsd:sequence>
@@ -24248,8 +24436,6 @@
                 <xsd:element ref="ns2:MediaServiceFastMetadata" minOccurs="0"/>
                 <xsd:element ref="ns2:MediaServiceAutoKeyPoints" minOccurs="0"/>
                 <xsd:element ref="ns2:MediaServiceKeyPoints" minOccurs="0"/>
-                <xsd:element ref="ns3:SharedWithUsers" minOccurs="0"/>
-                <xsd:element ref="ns3:SharedWithDetails" minOccurs="0"/>
               </xsd:all>
             </xsd:complexType>
           </xsd:element>
@@ -24257,7 +24443,7 @@
       </xsd:complexType>
     </xsd:element>
   </xsd:schema>
-  <xsd:schema xmlns:xsd="http://www.w3.org/2001/XMLSchema" xmlns:xs="http://www.w3.org/2001/XMLSchema" xmlns:dms="http://schemas.microsoft.com/office/2006/documentManagement/types" xmlns:pc="http://schemas.microsoft.com/office/infopath/2007/PartnerControls" targetNamespace="25b059c1-e0b1-4aae-b8e7-a9c1a20f7312" elementFormDefault="qualified">
+  <xsd:schema xmlns:xsd="http://www.w3.org/2001/XMLSchema" xmlns:xs="http://www.w3.org/2001/XMLSchema" xmlns:dms="http://schemas.microsoft.com/office/2006/documentManagement/types" xmlns:pc="http://schemas.microsoft.com/office/infopath/2007/PartnerControls" targetNamespace="ce9d22e8-e53b-4a04-8e21-044bd7a40ef2" elementFormDefault="qualified">
     <xsd:import namespace="http://schemas.microsoft.com/office/2006/documentManagement/types"/>
     <xsd:import namespace="http://schemas.microsoft.com/office/infopath/2007/PartnerControls"/>
     <xsd:element name="MediaServiceMetadata" ma:index="8" nillable="true" ma:displayName="MediaServiceMetadata" ma:hidden="true" ma:internalName="MediaServiceMetadata" ma:readOnly="true">
@@ -24276,36 +24462,6 @@
       </xsd:simpleType>
     </xsd:element>
     <xsd:element name="MediaServiceKeyPoints" ma:index="11" nillable="true" ma:displayName="KeyPoints" ma:internalName="MediaServiceKeyPoints" ma:readOnly="true">
-      <xsd:simpleType>
-        <xsd:restriction base="dms:Note">
-          <xsd:maxLength value="255"/>
-        </xsd:restriction>
-      </xsd:simpleType>
-    </xsd:element>
-  </xsd:schema>
-  <xsd:schema xmlns:xsd="http://www.w3.org/2001/XMLSchema" xmlns:xs="http://www.w3.org/2001/XMLSchema" xmlns:dms="http://schemas.microsoft.com/office/2006/documentManagement/types" xmlns:pc="http://schemas.microsoft.com/office/infopath/2007/PartnerControls" targetNamespace="24937d34-002f-4836-b77c-e21f12df0152" elementFormDefault="qualified">
-    <xsd:import namespace="http://schemas.microsoft.com/office/2006/documentManagement/types"/>
-    <xsd:import namespace="http://schemas.microsoft.com/office/infopath/2007/PartnerControls"/>
-    <xsd:element name="SharedWithUsers" ma:index="12" nillable="true" ma:displayName="Shared With" ma:internalName="SharedWithUsers" ma:readOnly="true">
-      <xsd:complexType>
-        <xsd:complexContent>
-          <xsd:extension base="dms:UserMulti">
-            <xsd:sequence>
-              <xsd:element name="UserInfo" minOccurs="0" maxOccurs="unbounded">
-                <xsd:complexType>
-                  <xsd:sequence>
-                    <xsd:element name="DisplayName" type="xsd:string" minOccurs="0"/>
-                    <xsd:element name="AccountId" type="dms:UserId" minOccurs="0" nillable="true"/>
-                    <xsd:element name="AccountType" type="xsd:string" minOccurs="0"/>
-                  </xsd:sequence>
-                </xsd:complexType>
-              </xsd:element>
-            </xsd:sequence>
-          </xsd:extension>
-        </xsd:complexContent>
-      </xsd:complexType>
-    </xsd:element>
-    <xsd:element name="SharedWithDetails" ma:index="13" nillable="true" ma:displayName="Shared With Details" ma:internalName="SharedWithDetails" ma:readOnly="true">
       <xsd:simpleType>
         <xsd:restriction base="dms:Note">
           <xsd:maxLength value="255"/>
@@ -24412,41 +24568,7 @@
 </ct:contentTypeSchema>
 </file>
 
-<file path=customXml/item2.xml><?xml version="1.0" encoding="utf-8"?>
-<p:properties xmlns:p="http://schemas.microsoft.com/office/2006/metadata/properties" xmlns:xsi="http://www.w3.org/2001/XMLSchema-instance" xmlns:pc="http://schemas.microsoft.com/office/infopath/2007/PartnerControls">
-  <documentManagement/>
-</p:properties>
-</file>
-
-<file path=customXml/item3.xml><?xml version="1.0" encoding="utf-8"?>
-<?mso-contentType ?>
-<FormTemplates xmlns="http://schemas.microsoft.com/sharepoint/v3/contenttype/forms">
-  <Display>DocumentLibraryForm</Display>
-  <Edit>DocumentLibraryForm</Edit>
-  <New>DocumentLibraryForm</New>
-</FormTemplates>
-</file>
-
 <file path=customXml/itemProps1.xml><?xml version="1.0" encoding="utf-8"?>
-<ds:datastoreItem xmlns:ds="http://schemas.openxmlformats.org/officeDocument/2006/customXml" ds:itemID="{50B43756-F2F7-4341-9ED7-6CDCB2E9AC83}">
-  <ds:schemaRefs>
-    <ds:schemaRef ds:uri="http://schemas.microsoft.com/office/2006/metadata/contentType"/>
-    <ds:schemaRef ds:uri="http://schemas.microsoft.com/office/2006/metadata/properties/metaAttributes"/>
-    <ds:schemaRef ds:uri="http://www.w3.org/2001/XMLSchema"/>
-    <ds:schemaRef ds:uri="http://schemas.microsoft.com/office/2006/metadata/properties"/>
-    <ds:schemaRef ds:uri="25b059c1-e0b1-4aae-b8e7-a9c1a20f7312"/>
-    <ds:schemaRef ds:uri="24937d34-002f-4836-b77c-e21f12df0152"/>
-    <ds:schemaRef ds:uri="http://schemas.microsoft.com/office/2006/documentManagement/types"/>
-    <ds:schemaRef ds:uri="http://schemas.microsoft.com/office/infopath/2007/PartnerControls"/>
-    <ds:schemaRef ds:uri="http://schemas.openxmlformats.org/package/2006/metadata/core-properties"/>
-    <ds:schemaRef ds:uri="http://purl.org/dc/elements/1.1/"/>
-    <ds:schemaRef ds:uri="http://purl.org/dc/terms/"/>
-    <ds:schemaRef ds:uri="http://schemas.microsoft.com/internal/obd"/>
-  </ds:schemaRefs>
-</ds:datastoreItem>
-</file>
-
-<file path=customXml/itemProps2.xml><?xml version="1.0" encoding="utf-8"?>
 <ds:datastoreItem xmlns:ds="http://schemas.openxmlformats.org/officeDocument/2006/customXml" ds:itemID="{2AC6E67E-42B4-40AF-80F4-D98253E4E21A}">
   <ds:schemaRefs>
     <ds:schemaRef ds:uri="24937d34-002f-4836-b77c-e21f12df0152"/>
@@ -24463,10 +24585,28 @@
 </ds:datastoreItem>
 </file>
 
-<file path=customXml/itemProps3.xml><?xml version="1.0" encoding="utf-8"?>
+<file path=customXml/itemProps2.xml><?xml version="1.0" encoding="utf-8"?>
 <ds:datastoreItem xmlns:ds="http://schemas.openxmlformats.org/officeDocument/2006/customXml" ds:itemID="{FC7B288A-115F-4EDF-8326-05039CEE1DB1}">
   <ds:schemaRefs>
     <ds:schemaRef ds:uri="http://schemas.microsoft.com/sharepoint/v3/contenttype/forms"/>
+  </ds:schemaRefs>
+</ds:datastoreItem>
+</file>
+
+<file path=customXml/itemProps3.xml><?xml version="1.0" encoding="utf-8"?>
+<ds:datastoreItem xmlns:ds="http://schemas.openxmlformats.org/officeDocument/2006/customXml" ds:itemID="{02E99134-6901-4F48-B32B-8CD957908DC8}">
+  <ds:schemaRefs>
+    <ds:schemaRef ds:uri="http://schemas.microsoft.com/office/2006/metadata/contentType"/>
+    <ds:schemaRef ds:uri="http://schemas.microsoft.com/office/2006/metadata/properties/metaAttributes"/>
+    <ds:schemaRef ds:uri="http://www.w3.org/2001/XMLSchema"/>
+    <ds:schemaRef ds:uri="http://schemas.microsoft.com/office/2006/metadata/properties"/>
+    <ds:schemaRef ds:uri="ce9d22e8-e53b-4a04-8e21-044bd7a40ef2"/>
+    <ds:schemaRef ds:uri="http://schemas.microsoft.com/office/2006/documentManagement/types"/>
+    <ds:schemaRef ds:uri="http://schemas.microsoft.com/office/infopath/2007/PartnerControls"/>
+    <ds:schemaRef ds:uri="http://schemas.openxmlformats.org/package/2006/metadata/core-properties"/>
+    <ds:schemaRef ds:uri="http://purl.org/dc/elements/1.1/"/>
+    <ds:schemaRef ds:uri="http://purl.org/dc/terms/"/>
+    <ds:schemaRef ds:uri="http://schemas.microsoft.com/internal/obd"/>
   </ds:schemaRefs>
 </ds:datastoreItem>
 </file>

</xml_diff>